<commit_message>
small neural nets updates
</commit_message>
<xml_diff>
--- a/machine_learning/singlelayer_neural_networks/images/perceptrons.pptx
+++ b/machine_learning/singlelayer_neural_networks/images/perceptrons.pptx
@@ -203,7 +203,7 @@
           <a:p>
             <a:fld id="{D2582FBB-B8C5-DF4F-96EE-6EA9B5D437D8}" type="datetimeFigureOut">
               <a:rPr lang="en-US" smtClean="0"/>
-              <a:t>3/14/15</a:t>
+              <a:t>3/15/15</a:t>
             </a:fld>
             <a:endParaRPr lang="en-US"/>
           </a:p>
@@ -820,7 +820,7 @@
           <a:p>
             <a:fld id="{58016D78-6F7A-3243-B377-764733721953}" type="datetimeFigureOut">
               <a:rPr lang="en-US" smtClean="0"/>
-              <a:t>3/14/15</a:t>
+              <a:t>3/15/15</a:t>
             </a:fld>
             <a:endParaRPr lang="en-US"/>
           </a:p>
@@ -990,7 +990,7 @@
           <a:p>
             <a:fld id="{58016D78-6F7A-3243-B377-764733721953}" type="datetimeFigureOut">
               <a:rPr lang="en-US" smtClean="0"/>
-              <a:t>3/14/15</a:t>
+              <a:t>3/15/15</a:t>
             </a:fld>
             <a:endParaRPr lang="en-US"/>
           </a:p>
@@ -1170,7 +1170,7 @@
           <a:p>
             <a:fld id="{58016D78-6F7A-3243-B377-764733721953}" type="datetimeFigureOut">
               <a:rPr lang="en-US" smtClean="0"/>
-              <a:t>3/14/15</a:t>
+              <a:t>3/15/15</a:t>
             </a:fld>
             <a:endParaRPr lang="en-US"/>
           </a:p>
@@ -1340,7 +1340,7 @@
           <a:p>
             <a:fld id="{58016D78-6F7A-3243-B377-764733721953}" type="datetimeFigureOut">
               <a:rPr lang="en-US" smtClean="0"/>
-              <a:t>3/14/15</a:t>
+              <a:t>3/15/15</a:t>
             </a:fld>
             <a:endParaRPr lang="en-US"/>
           </a:p>
@@ -1586,7 +1586,7 @@
           <a:p>
             <a:fld id="{58016D78-6F7A-3243-B377-764733721953}" type="datetimeFigureOut">
               <a:rPr lang="en-US" smtClean="0"/>
-              <a:t>3/14/15</a:t>
+              <a:t>3/15/15</a:t>
             </a:fld>
             <a:endParaRPr lang="en-US"/>
           </a:p>
@@ -1874,7 +1874,7 @@
           <a:p>
             <a:fld id="{58016D78-6F7A-3243-B377-764733721953}" type="datetimeFigureOut">
               <a:rPr lang="en-US" smtClean="0"/>
-              <a:t>3/14/15</a:t>
+              <a:t>3/15/15</a:t>
             </a:fld>
             <a:endParaRPr lang="en-US"/>
           </a:p>
@@ -2296,7 +2296,7 @@
           <a:p>
             <a:fld id="{58016D78-6F7A-3243-B377-764733721953}" type="datetimeFigureOut">
               <a:rPr lang="en-US" smtClean="0"/>
-              <a:t>3/14/15</a:t>
+              <a:t>3/15/15</a:t>
             </a:fld>
             <a:endParaRPr lang="en-US"/>
           </a:p>
@@ -2414,7 +2414,7 @@
           <a:p>
             <a:fld id="{58016D78-6F7A-3243-B377-764733721953}" type="datetimeFigureOut">
               <a:rPr lang="en-US" smtClean="0"/>
-              <a:t>3/14/15</a:t>
+              <a:t>3/15/15</a:t>
             </a:fld>
             <a:endParaRPr lang="en-US"/>
           </a:p>
@@ -2509,7 +2509,7 @@
           <a:p>
             <a:fld id="{58016D78-6F7A-3243-B377-764733721953}" type="datetimeFigureOut">
               <a:rPr lang="en-US" smtClean="0"/>
-              <a:t>3/14/15</a:t>
+              <a:t>3/15/15</a:t>
             </a:fld>
             <a:endParaRPr lang="en-US"/>
           </a:p>
@@ -2786,7 +2786,7 @@
           <a:p>
             <a:fld id="{58016D78-6F7A-3243-B377-764733721953}" type="datetimeFigureOut">
               <a:rPr lang="en-US" smtClean="0"/>
-              <a:t>3/14/15</a:t>
+              <a:t>3/15/15</a:t>
             </a:fld>
             <a:endParaRPr lang="en-US"/>
           </a:p>
@@ -3039,7 +3039,7 @@
           <a:p>
             <a:fld id="{58016D78-6F7A-3243-B377-764733721953}" type="datetimeFigureOut">
               <a:rPr lang="en-US" smtClean="0"/>
-              <a:t>3/14/15</a:t>
+              <a:t>3/15/15</a:t>
             </a:fld>
             <a:endParaRPr lang="en-US"/>
           </a:p>
@@ -3252,7 +3252,7 @@
           <a:p>
             <a:fld id="{58016D78-6F7A-3243-B377-764733721953}" type="datetimeFigureOut">
               <a:rPr lang="en-US" smtClean="0"/>
-              <a:t>3/14/15</a:t>
+              <a:t>3/15/15</a:t>
             </a:fld>
             <a:endParaRPr lang="en-US"/>
           </a:p>
@@ -7466,8 +7466,9 @@
             <a:solidFill>
               <a:schemeClr val="tx1"/>
             </a:solidFill>
-            <a:prstDash val="sysDash"/>
-          </a:ln>
+            <a:prstDash val="dash"/>
+          </a:ln>
+          <a:effectLst/>
         </p:spPr>
         <p:style>
           <a:lnRef idx="2">
@@ -7484,6 +7485,172 @@
           </a:fontRef>
         </p:style>
       </p:cxnSp>
+      <p:cxnSp>
+        <p:nvCxnSpPr>
+          <p:cNvPr id="3" name="Straight Connector 2"/>
+          <p:cNvCxnSpPr/>
+          <p:nvPr/>
+        </p:nvCxnSpPr>
+        <p:spPr>
+          <a:xfrm flipV="1">
+            <a:off x="2581610" y="4679783"/>
+            <a:ext cx="741880" cy="293957"/>
+          </a:xfrm>
+          <a:prstGeom prst="line">
+            <a:avLst/>
+          </a:prstGeom>
+          <a:ln w="12700">
+            <a:solidFill>
+              <a:schemeClr val="tx1"/>
+            </a:solidFill>
+          </a:ln>
+        </p:spPr>
+        <p:style>
+          <a:lnRef idx="2">
+            <a:schemeClr val="accent1"/>
+          </a:lnRef>
+          <a:fillRef idx="0">
+            <a:schemeClr val="accent1"/>
+          </a:fillRef>
+          <a:effectRef idx="1">
+            <a:schemeClr val="accent1"/>
+          </a:effectRef>
+          <a:fontRef idx="minor">
+            <a:schemeClr val="tx1"/>
+          </a:fontRef>
+        </p:style>
+      </p:cxnSp>
+      <p:sp>
+        <p:nvSpPr>
+          <p:cNvPr id="5" name="TextBox 4"/>
+          <p:cNvSpPr txBox="1"/>
+          <p:nvPr/>
+        </p:nvSpPr>
+        <p:spPr>
+          <a:xfrm>
+            <a:off x="1105334" y="4812053"/>
+            <a:ext cx="1716797" cy="523220"/>
+          </a:xfrm>
+          <a:prstGeom prst="rect">
+            <a:avLst/>
+          </a:prstGeom>
+          <a:noFill/>
+        </p:spPr>
+        <p:txBody>
+          <a:bodyPr wrap="square" rtlCol="0">
+            <a:spAutoFit/>
+          </a:bodyPr>
+          <a:lstStyle/>
+          <a:p>
+            <a:r>
+              <a:rPr lang="en-US" sz="1400" dirty="0" smtClean="0"/>
+              <a:t>Decision boundary </a:t>
+            </a:r>
+          </a:p>
+          <a:p>
+            <a:r>
+              <a:rPr lang="en-US" sz="1400" dirty="0" smtClean="0"/>
+              <a:t>of the perceptron</a:t>
+            </a:r>
+            <a:endParaRPr lang="en-US" sz="1400" dirty="0"/>
+          </a:p>
+        </p:txBody>
+      </p:sp>
+      <p:sp>
+        <p:nvSpPr>
+          <p:cNvPr id="8" name="TextBox 7"/>
+          <p:cNvSpPr txBox="1"/>
+          <p:nvPr/>
+        </p:nvSpPr>
+        <p:spPr>
+          <a:xfrm>
+            <a:off x="1105334" y="3731965"/>
+            <a:ext cx="1716797" cy="523220"/>
+          </a:xfrm>
+          <a:prstGeom prst="rect">
+            <a:avLst/>
+          </a:prstGeom>
+          <a:noFill/>
+        </p:spPr>
+        <p:txBody>
+          <a:bodyPr wrap="square" rtlCol="0">
+            <a:spAutoFit/>
+          </a:bodyPr>
+          <a:lstStyle/>
+          <a:p>
+            <a:r>
+              <a:rPr lang="en-US" sz="1400" dirty="0" smtClean="0"/>
+              <a:t>Decision boundary with large margin</a:t>
+            </a:r>
+            <a:endParaRPr lang="en-US" sz="1400" dirty="0"/>
+          </a:p>
+        </p:txBody>
+      </p:sp>
+      <p:cxnSp>
+        <p:nvCxnSpPr>
+          <p:cNvPr id="9" name="Straight Connector 8"/>
+          <p:cNvCxnSpPr/>
+          <p:nvPr/>
+        </p:nvCxnSpPr>
+        <p:spPr>
+          <a:xfrm>
+            <a:off x="2581610" y="3884418"/>
+            <a:ext cx="829351" cy="296023"/>
+          </a:xfrm>
+          <a:prstGeom prst="line">
+            <a:avLst/>
+          </a:prstGeom>
+          <a:ln w="12700">
+            <a:solidFill>
+              <a:schemeClr val="tx1"/>
+            </a:solidFill>
+          </a:ln>
+        </p:spPr>
+        <p:style>
+          <a:lnRef idx="2">
+            <a:schemeClr val="accent1"/>
+          </a:lnRef>
+          <a:fillRef idx="0">
+            <a:schemeClr val="accent1"/>
+          </a:fillRef>
+          <a:effectRef idx="1">
+            <a:schemeClr val="accent1"/>
+          </a:effectRef>
+          <a:fontRef idx="minor">
+            <a:schemeClr val="tx1"/>
+          </a:fontRef>
+        </p:style>
+      </p:cxnSp>
+      <p:sp>
+        <p:nvSpPr>
+          <p:cNvPr id="13" name="TextBox 12"/>
+          <p:cNvSpPr txBox="1"/>
+          <p:nvPr/>
+        </p:nvSpPr>
+        <p:spPr>
+          <a:xfrm>
+            <a:off x="3029518" y="6093964"/>
+            <a:ext cx="4857713" cy="369332"/>
+          </a:xfrm>
+          <a:prstGeom prst="rect">
+            <a:avLst/>
+          </a:prstGeom>
+          <a:noFill/>
+        </p:spPr>
+        <p:txBody>
+          <a:bodyPr wrap="square" rtlCol="0">
+            <a:spAutoFit/>
+          </a:bodyPr>
+          <a:lstStyle/>
+          <a:p>
+            <a:r>
+              <a:rPr lang="en-US" b="1" dirty="0" smtClean="0"/>
+              <a:t>Example of a large-margin decision boundary.</a:t>
+            </a:r>
+            <a:endParaRPr lang="en-US" b="1" dirty="0" smtClean="0"/>
+          </a:p>
+        </p:txBody>
+      </p:sp>
     </p:spTree>
     <p:extLst>
       <p:ext uri="{BB962C8B-B14F-4D97-AF65-F5344CB8AC3E}">
@@ -22795,13 +22962,8 @@
             </a:r>
             <a:r>
               <a:rPr lang="en-US" b="1" dirty="0" smtClean="0"/>
-              <a:t>for artificial neurons</a:t>
-            </a:r>
-            <a:r>
-              <a:rPr lang="en-US" b="1" dirty="0" smtClean="0"/>
-              <a:t>.</a:t>
-            </a:r>
-            <a:endParaRPr lang="en-US" b="1" dirty="0" smtClean="0"/>
+              <a:t>for artificial neurons.</a:t>
+            </a:r>
           </a:p>
         </p:txBody>
       </p:sp>

</xml_diff>